<commit_message>
Added reference to this repo in slides.
</commit_message>
<xml_diff>
--- a/Introduction to Scala.pptx
+++ b/Introduction to Scala.pptx
@@ -116,6 +116,11 @@
       </a:defRPr>
     </a:lvl9pPr>
   </p:defaultTextStyle>
+  <p:extLst>
+    <p:ext uri="{EFAFB233-063F-42B5-8137-9DF3F51BA10A}">
+      <p15:sldGuideLst xmlns:p15="http://schemas.microsoft.com/office/powerpoint/2012/main"/>
+    </p:ext>
+  </p:extLst>
 </p:presentation>
 </file>
 
@@ -250,7 +255,7 @@
           <a:p>
             <a:fld id="{0EF83348-4F30-4AF1-9141-92912B0F5DB1}" type="datetimeFigureOut">
               <a:rPr lang="uk-UA" smtClean="0"/>
-              <a:t>07.11.2013</a:t>
+              <a:t>08.11.2013</a:t>
             </a:fld>
             <a:endParaRPr lang="uk-UA"/>
           </a:p>
@@ -420,7 +425,7 @@
           <a:p>
             <a:fld id="{0EF83348-4F30-4AF1-9141-92912B0F5DB1}" type="datetimeFigureOut">
               <a:rPr lang="uk-UA" smtClean="0"/>
-              <a:t>07.11.2013</a:t>
+              <a:t>08.11.2013</a:t>
             </a:fld>
             <a:endParaRPr lang="uk-UA"/>
           </a:p>
@@ -600,7 +605,7 @@
           <a:p>
             <a:fld id="{0EF83348-4F30-4AF1-9141-92912B0F5DB1}" type="datetimeFigureOut">
               <a:rPr lang="uk-UA" smtClean="0"/>
-              <a:t>07.11.2013</a:t>
+              <a:t>08.11.2013</a:t>
             </a:fld>
             <a:endParaRPr lang="uk-UA"/>
           </a:p>
@@ -770,7 +775,7 @@
           <a:p>
             <a:fld id="{0EF83348-4F30-4AF1-9141-92912B0F5DB1}" type="datetimeFigureOut">
               <a:rPr lang="uk-UA" smtClean="0"/>
-              <a:t>07.11.2013</a:t>
+              <a:t>08.11.2013</a:t>
             </a:fld>
             <a:endParaRPr lang="uk-UA"/>
           </a:p>
@@ -1016,7 +1021,7 @@
           <a:p>
             <a:fld id="{0EF83348-4F30-4AF1-9141-92912B0F5DB1}" type="datetimeFigureOut">
               <a:rPr lang="uk-UA" smtClean="0"/>
-              <a:t>07.11.2013</a:t>
+              <a:t>08.11.2013</a:t>
             </a:fld>
             <a:endParaRPr lang="uk-UA"/>
           </a:p>
@@ -1248,7 +1253,7 @@
           <a:p>
             <a:fld id="{0EF83348-4F30-4AF1-9141-92912B0F5DB1}" type="datetimeFigureOut">
               <a:rPr lang="uk-UA" smtClean="0"/>
-              <a:t>07.11.2013</a:t>
+              <a:t>08.11.2013</a:t>
             </a:fld>
             <a:endParaRPr lang="uk-UA"/>
           </a:p>
@@ -1615,7 +1620,7 @@
           <a:p>
             <a:fld id="{0EF83348-4F30-4AF1-9141-92912B0F5DB1}" type="datetimeFigureOut">
               <a:rPr lang="uk-UA" smtClean="0"/>
-              <a:t>07.11.2013</a:t>
+              <a:t>08.11.2013</a:t>
             </a:fld>
             <a:endParaRPr lang="uk-UA"/>
           </a:p>
@@ -1733,7 +1738,7 @@
           <a:p>
             <a:fld id="{0EF83348-4F30-4AF1-9141-92912B0F5DB1}" type="datetimeFigureOut">
               <a:rPr lang="uk-UA" smtClean="0"/>
-              <a:t>07.11.2013</a:t>
+              <a:t>08.11.2013</a:t>
             </a:fld>
             <a:endParaRPr lang="uk-UA"/>
           </a:p>
@@ -1828,7 +1833,7 @@
           <a:p>
             <a:fld id="{0EF83348-4F30-4AF1-9141-92912B0F5DB1}" type="datetimeFigureOut">
               <a:rPr lang="uk-UA" smtClean="0"/>
-              <a:t>07.11.2013</a:t>
+              <a:t>08.11.2013</a:t>
             </a:fld>
             <a:endParaRPr lang="uk-UA"/>
           </a:p>
@@ -2105,7 +2110,7 @@
           <a:p>
             <a:fld id="{0EF83348-4F30-4AF1-9141-92912B0F5DB1}" type="datetimeFigureOut">
               <a:rPr lang="uk-UA" smtClean="0"/>
-              <a:t>07.11.2013</a:t>
+              <a:t>08.11.2013</a:t>
             </a:fld>
             <a:endParaRPr lang="uk-UA"/>
           </a:p>
@@ -2358,7 +2363,7 @@
           <a:p>
             <a:fld id="{0EF83348-4F30-4AF1-9141-92912B0F5DB1}" type="datetimeFigureOut">
               <a:rPr lang="uk-UA" smtClean="0"/>
-              <a:t>07.11.2013</a:t>
+              <a:t>08.11.2013</a:t>
             </a:fld>
             <a:endParaRPr lang="uk-UA"/>
           </a:p>
@@ -2571,7 +2576,7 @@
           <a:p>
             <a:fld id="{0EF83348-4F30-4AF1-9141-92912B0F5DB1}" type="datetimeFigureOut">
               <a:rPr lang="uk-UA" smtClean="0"/>
-              <a:t>07.11.2013</a:t>
+              <a:t>08.11.2013</a:t>
             </a:fld>
             <a:endParaRPr lang="uk-UA"/>
           </a:p>
@@ -3827,8 +3832,39 @@
             </a:r>
             <a:r>
               <a:rPr lang="en-US" dirty="0" smtClean="0"/>
-              <a:t> with demo</a:t>
-            </a:r>
+              <a:t> </a:t>
+            </a:r>
+            <a:r>
+              <a:rPr lang="en-US" smtClean="0"/>
+              <a:t>with </a:t>
+            </a:r>
+            <a:r>
+              <a:rPr lang="en-US"/>
+              <a:t>demo </a:t>
+            </a:r>
+            <a:r>
+              <a:rPr lang="en-US">
+                <a:hlinkClick r:id="rId7"/>
+              </a:rPr>
+              <a:t>https</a:t>
+            </a:r>
+            <a:r>
+              <a:rPr lang="en-US">
+                <a:hlinkClick r:id="rId7"/>
+              </a:rPr>
+              <a:t>://</a:t>
+            </a:r>
+            <a:r>
+              <a:rPr lang="en-US" smtClean="0">
+                <a:hlinkClick r:id="rId7"/>
+              </a:rPr>
+              <a:t>github.com/ivan-gusiev/scala-demo</a:t>
+            </a:r>
+            <a:r>
+              <a:rPr lang="en-US" smtClean="0"/>
+              <a:t> </a:t>
+            </a:r>
+            <a:endParaRPr lang="en-US" dirty="0" smtClean="0"/>
           </a:p>
           <a:p>
             <a:pPr marL="514350" indent="-514350">

</xml_diff>